<commit_message>
Update Team Noobcoder presentation.pptx
</commit_message>
<xml_diff>
--- a/Project_Week_4/Team Noobcoder presentation.pptx
+++ b/Project_Week_4/Team Noobcoder presentation.pptx
@@ -313,6 +313,200 @@
     </pc:docChg>
   </pc:docChgLst>
   <pc:docChgLst>
+    <pc:chgData name="swift" userId="S::swift1699_gmail.com#ext#@ohana042.onmicrosoft.com::75bb29f9-690c-4fad-984c-04f4d2790b53" providerId="AD" clId="Web-{18847984-1E08-A796-A12F-F7160350E3ED}"/>
+    <pc:docChg chg="addSld delSld modSld">
+      <pc:chgData name="swift" userId="S::swift1699_gmail.com#ext#@ohana042.onmicrosoft.com::75bb29f9-690c-4fad-984c-04f4d2790b53" providerId="AD" clId="Web-{18847984-1E08-A796-A12F-F7160350E3ED}" dt="2020-11-01T00:26:01.039" v="240" actId="1076"/>
+      <pc:docMkLst>
+        <pc:docMk/>
+      </pc:docMkLst>
+      <pc:sldChg chg="modSp">
+        <pc:chgData name="swift" userId="S::swift1699_gmail.com#ext#@ohana042.onmicrosoft.com::75bb29f9-690c-4fad-984c-04f4d2790b53" providerId="AD" clId="Web-{18847984-1E08-A796-A12F-F7160350E3ED}" dt="2020-10-31T21:50:36.796" v="28" actId="20577"/>
+        <pc:sldMkLst>
+          <pc:docMk/>
+          <pc:sldMk cId="109857222" sldId="256"/>
+        </pc:sldMkLst>
+        <pc:spChg chg="mod">
+          <ac:chgData name="swift" userId="S::swift1699_gmail.com#ext#@ohana042.onmicrosoft.com::75bb29f9-690c-4fad-984c-04f4d2790b53" providerId="AD" clId="Web-{18847984-1E08-A796-A12F-F7160350E3ED}" dt="2020-10-31T21:50:36.796" v="28" actId="20577"/>
+          <ac:spMkLst>
+            <pc:docMk/>
+            <pc:sldMk cId="109857222" sldId="256"/>
+            <ac:spMk id="2" creationId="{00000000-0000-0000-0000-000000000000}"/>
+          </ac:spMkLst>
+        </pc:spChg>
+      </pc:sldChg>
+      <pc:sldChg chg="addSp delSp modSp new">
+        <pc:chgData name="swift" userId="S::swift1699_gmail.com#ext#@ohana042.onmicrosoft.com::75bb29f9-690c-4fad-984c-04f4d2790b53" providerId="AD" clId="Web-{18847984-1E08-A796-A12F-F7160350E3ED}" dt="2020-11-01T00:18:18.510" v="191" actId="14100"/>
+        <pc:sldMkLst>
+          <pc:docMk/>
+          <pc:sldMk cId="3193242618" sldId="259"/>
+        </pc:sldMkLst>
+        <pc:spChg chg="del mod">
+          <ac:chgData name="swift" userId="S::swift1699_gmail.com#ext#@ohana042.onmicrosoft.com::75bb29f9-690c-4fad-984c-04f4d2790b53" providerId="AD" clId="Web-{18847984-1E08-A796-A12F-F7160350E3ED}" dt="2020-11-01T00:15:22.833" v="159"/>
+          <ac:spMkLst>
+            <pc:docMk/>
+            <pc:sldMk cId="3193242618" sldId="259"/>
+            <ac:spMk id="3" creationId="{C56C5C63-FF79-49A2-B384-93ED6B1C43BE}"/>
+          </ac:spMkLst>
+        </pc:spChg>
+        <pc:picChg chg="add mod ord">
+          <ac:chgData name="swift" userId="S::swift1699_gmail.com#ext#@ohana042.onmicrosoft.com::75bb29f9-690c-4fad-984c-04f4d2790b53" providerId="AD" clId="Web-{18847984-1E08-A796-A12F-F7160350E3ED}" dt="2020-11-01T00:18:18.510" v="191" actId="14100"/>
+          <ac:picMkLst>
+            <pc:docMk/>
+            <pc:sldMk cId="3193242618" sldId="259"/>
+            <ac:picMk id="4" creationId="{9BAD6616-41FE-46E0-9709-61844EA3B54A}"/>
+          </ac:picMkLst>
+        </pc:picChg>
+        <pc:picChg chg="add mod">
+          <ac:chgData name="swift" userId="S::swift1699_gmail.com#ext#@ohana042.onmicrosoft.com::75bb29f9-690c-4fad-984c-04f4d2790b53" providerId="AD" clId="Web-{18847984-1E08-A796-A12F-F7160350E3ED}" dt="2020-11-01T00:16:59.681" v="180" actId="1076"/>
+          <ac:picMkLst>
+            <pc:docMk/>
+            <pc:sldMk cId="3193242618" sldId="259"/>
+            <ac:picMk id="5" creationId="{EC40FD11-90CD-41A2-8808-C5A724A023A9}"/>
+          </ac:picMkLst>
+        </pc:picChg>
+        <pc:picChg chg="add mod">
+          <ac:chgData name="swift" userId="S::swift1699_gmail.com#ext#@ohana042.onmicrosoft.com::75bb29f9-690c-4fad-984c-04f4d2790b53" providerId="AD" clId="Web-{18847984-1E08-A796-A12F-F7160350E3ED}" dt="2020-11-01T00:17:31.557" v="185" actId="14100"/>
+          <ac:picMkLst>
+            <pc:docMk/>
+            <pc:sldMk cId="3193242618" sldId="259"/>
+            <ac:picMk id="6" creationId="{CD75B64D-BF89-4F7D-AE54-0419F69FE8A6}"/>
+          </ac:picMkLst>
+        </pc:picChg>
+        <pc:picChg chg="add mod">
+          <ac:chgData name="swift" userId="S::swift1699_gmail.com#ext#@ohana042.onmicrosoft.com::75bb29f9-690c-4fad-984c-04f4d2790b53" providerId="AD" clId="Web-{18847984-1E08-A796-A12F-F7160350E3ED}" dt="2020-11-01T00:18:07.120" v="190" actId="14100"/>
+          <ac:picMkLst>
+            <pc:docMk/>
+            <pc:sldMk cId="3193242618" sldId="259"/>
+            <ac:picMk id="7" creationId="{AB8C22D1-20D0-4E9C-BFCA-AF0BA29EA071}"/>
+          </ac:picMkLst>
+        </pc:picChg>
+      </pc:sldChg>
+      <pc:sldChg chg="addSp delSp modSp new">
+        <pc:chgData name="swift" userId="S::swift1699_gmail.com#ext#@ohana042.onmicrosoft.com::75bb29f9-690c-4fad-984c-04f4d2790b53" providerId="AD" clId="Web-{18847984-1E08-A796-A12F-F7160350E3ED}" dt="2020-10-31T22:09:57.899" v="109" actId="1076"/>
+        <pc:sldMkLst>
+          <pc:docMk/>
+          <pc:sldMk cId="1267369005" sldId="261"/>
+        </pc:sldMkLst>
+        <pc:spChg chg="mod">
+          <ac:chgData name="swift" userId="S::swift1699_gmail.com#ext#@ohana042.onmicrosoft.com::75bb29f9-690c-4fad-984c-04f4d2790b53" providerId="AD" clId="Web-{18847984-1E08-A796-A12F-F7160350E3ED}" dt="2020-10-31T22:09:43.102" v="106" actId="1076"/>
+          <ac:spMkLst>
+            <pc:docMk/>
+            <pc:sldMk cId="1267369005" sldId="261"/>
+            <ac:spMk id="2" creationId="{587F4538-A939-4452-B475-332F44BC6F2F}"/>
+          </ac:spMkLst>
+        </pc:spChg>
+        <pc:spChg chg="del">
+          <ac:chgData name="swift" userId="S::swift1699_gmail.com#ext#@ohana042.onmicrosoft.com::75bb29f9-690c-4fad-984c-04f4d2790b53" providerId="AD" clId="Web-{18847984-1E08-A796-A12F-F7160350E3ED}" dt="2020-10-31T22:08:02.649" v="90"/>
+          <ac:spMkLst>
+            <pc:docMk/>
+            <pc:sldMk cId="1267369005" sldId="261"/>
+            <ac:spMk id="3" creationId="{89F80E3E-9E2B-4B2A-A556-13CBAF3D1597}"/>
+          </ac:spMkLst>
+        </pc:spChg>
+        <pc:picChg chg="add mod ord modCrop">
+          <ac:chgData name="swift" userId="S::swift1699_gmail.com#ext#@ohana042.onmicrosoft.com::75bb29f9-690c-4fad-984c-04f4d2790b53" providerId="AD" clId="Web-{18847984-1E08-A796-A12F-F7160350E3ED}" dt="2020-10-31T22:09:57.899" v="109" actId="1076"/>
+          <ac:picMkLst>
+            <pc:docMk/>
+            <pc:sldMk cId="1267369005" sldId="261"/>
+            <ac:picMk id="4" creationId="{44AFD46C-F221-43EF-B008-F2FE8FB420FB}"/>
+          </ac:picMkLst>
+        </pc:picChg>
+      </pc:sldChg>
+      <pc:sldChg chg="modSp new">
+        <pc:chgData name="swift" userId="S::swift1699_gmail.com#ext#@ohana042.onmicrosoft.com::75bb29f9-690c-4fad-984c-04f4d2790b53" providerId="AD" clId="Web-{18847984-1E08-A796-A12F-F7160350E3ED}" dt="2020-10-31T22:16:52.622" v="152" actId="20577"/>
+        <pc:sldMkLst>
+          <pc:docMk/>
+          <pc:sldMk cId="4101956405" sldId="262"/>
+        </pc:sldMkLst>
+        <pc:spChg chg="mod">
+          <ac:chgData name="swift" userId="S::swift1699_gmail.com#ext#@ohana042.onmicrosoft.com::75bb29f9-690c-4fad-984c-04f4d2790b53" providerId="AD" clId="Web-{18847984-1E08-A796-A12F-F7160350E3ED}" dt="2020-10-31T22:16:52.622" v="152" actId="20577"/>
+          <ac:spMkLst>
+            <pc:docMk/>
+            <pc:sldMk cId="4101956405" sldId="262"/>
+            <ac:spMk id="2" creationId="{39C6DD24-F269-4AA6-B41B-431B19BDFF22}"/>
+          </ac:spMkLst>
+        </pc:spChg>
+      </pc:sldChg>
+      <pc:sldChg chg="addSp modSp new">
+        <pc:chgData name="swift" userId="S::swift1699_gmail.com#ext#@ohana042.onmicrosoft.com::75bb29f9-690c-4fad-984c-04f4d2790b53" providerId="AD" clId="Web-{18847984-1E08-A796-A12F-F7160350E3ED}" dt="2020-11-01T00:24:57.003" v="219" actId="14100"/>
+        <pc:sldMkLst>
+          <pc:docMk/>
+          <pc:sldMk cId="1877693977" sldId="263"/>
+        </pc:sldMkLst>
+        <pc:spChg chg="mod">
+          <ac:chgData name="swift" userId="S::swift1699_gmail.com#ext#@ohana042.onmicrosoft.com::75bb29f9-690c-4fad-984c-04f4d2790b53" providerId="AD" clId="Web-{18847984-1E08-A796-A12F-F7160350E3ED}" dt="2020-11-01T00:23:43.214" v="199" actId="20577"/>
+          <ac:spMkLst>
+            <pc:docMk/>
+            <pc:sldMk cId="1877693977" sldId="263"/>
+            <ac:spMk id="2" creationId="{A5DD6B90-6B49-457B-A17F-8FCA3DBC00F1}"/>
+          </ac:spMkLst>
+        </pc:spChg>
+        <pc:picChg chg="add mod">
+          <ac:chgData name="swift" userId="S::swift1699_gmail.com#ext#@ohana042.onmicrosoft.com::75bb29f9-690c-4fad-984c-04f4d2790b53" providerId="AD" clId="Web-{18847984-1E08-A796-A12F-F7160350E3ED}" dt="2020-11-01T00:24:03.824" v="205" actId="1076"/>
+          <ac:picMkLst>
+            <pc:docMk/>
+            <pc:sldMk cId="1877693977" sldId="263"/>
+            <ac:picMk id="3" creationId="{57B776F1-90B9-41C2-A895-F73F855610E9}"/>
+          </ac:picMkLst>
+        </pc:picChg>
+        <pc:picChg chg="add mod">
+          <ac:chgData name="swift" userId="S::swift1699_gmail.com#ext#@ohana042.onmicrosoft.com::75bb29f9-690c-4fad-984c-04f4d2790b53" providerId="AD" clId="Web-{18847984-1E08-A796-A12F-F7160350E3ED}" dt="2020-11-01T00:24:23.543" v="211" actId="1076"/>
+          <ac:picMkLst>
+            <pc:docMk/>
+            <pc:sldMk cId="1877693977" sldId="263"/>
+            <ac:picMk id="4" creationId="{EAE075FA-916A-40BF-B5B8-003A25484CB6}"/>
+          </ac:picMkLst>
+        </pc:picChg>
+        <pc:picChg chg="add mod">
+          <ac:chgData name="swift" userId="S::swift1699_gmail.com#ext#@ohana042.onmicrosoft.com::75bb29f9-690c-4fad-984c-04f4d2790b53" providerId="AD" clId="Web-{18847984-1E08-A796-A12F-F7160350E3ED}" dt="2020-11-01T00:24:57.003" v="219" actId="14100"/>
+          <ac:picMkLst>
+            <pc:docMk/>
+            <pc:sldMk cId="1877693977" sldId="263"/>
+            <ac:picMk id="5" creationId="{C14312DF-EF9D-43AE-9BF5-B566AF5ED8D9}"/>
+          </ac:picMkLst>
+        </pc:picChg>
+      </pc:sldChg>
+      <pc:sldChg chg="new del">
+        <pc:chgData name="swift" userId="S::swift1699_gmail.com#ext#@ohana042.onmicrosoft.com::75bb29f9-690c-4fad-984c-04f4d2790b53" providerId="AD" clId="Web-{18847984-1E08-A796-A12F-F7160350E3ED}" dt="2020-11-01T00:23:27.397" v="193"/>
+        <pc:sldMkLst>
+          <pc:docMk/>
+          <pc:sldMk cId="3845205481" sldId="263"/>
+        </pc:sldMkLst>
+      </pc:sldChg>
+      <pc:sldChg chg="addSp modSp new">
+        <pc:chgData name="swift" userId="S::swift1699_gmail.com#ext#@ohana042.onmicrosoft.com::75bb29f9-690c-4fad-984c-04f4d2790b53" providerId="AD" clId="Web-{18847984-1E08-A796-A12F-F7160350E3ED}" dt="2020-11-01T00:26:01.039" v="240" actId="1076"/>
+        <pc:sldMkLst>
+          <pc:docMk/>
+          <pc:sldMk cId="2085439630" sldId="264"/>
+        </pc:sldMkLst>
+        <pc:spChg chg="mod">
+          <ac:chgData name="swift" userId="S::swift1699_gmail.com#ext#@ohana042.onmicrosoft.com::75bb29f9-690c-4fad-984c-04f4d2790b53" providerId="AD" clId="Web-{18847984-1E08-A796-A12F-F7160350E3ED}" dt="2020-11-01T00:25:18.007" v="231" actId="20577"/>
+          <ac:spMkLst>
+            <pc:docMk/>
+            <pc:sldMk cId="2085439630" sldId="264"/>
+            <ac:spMk id="2" creationId="{9379D913-B49C-4DE7-BD7B-E2ABC2E358C1}"/>
+          </ac:spMkLst>
+        </pc:spChg>
+        <pc:picChg chg="add mod">
+          <ac:chgData name="swift" userId="S::swift1699_gmail.com#ext#@ohana042.onmicrosoft.com::75bb29f9-690c-4fad-984c-04f4d2790b53" providerId="AD" clId="Web-{18847984-1E08-A796-A12F-F7160350E3ED}" dt="2020-11-01T00:25:49.570" v="237" actId="1076"/>
+          <ac:picMkLst>
+            <pc:docMk/>
+            <pc:sldMk cId="2085439630" sldId="264"/>
+            <ac:picMk id="3" creationId="{4684C647-4F19-4553-B741-112FE3F7B33C}"/>
+          </ac:picMkLst>
+        </pc:picChg>
+        <pc:picChg chg="add mod">
+          <ac:chgData name="swift" userId="S::swift1699_gmail.com#ext#@ohana042.onmicrosoft.com::75bb29f9-690c-4fad-984c-04f4d2790b53" providerId="AD" clId="Web-{18847984-1E08-A796-A12F-F7160350E3ED}" dt="2020-11-01T00:26:01.039" v="240" actId="1076"/>
+          <ac:picMkLst>
+            <pc:docMk/>
+            <pc:sldMk cId="2085439630" sldId="264"/>
+            <ac:picMk id="4" creationId="{45E1A4A2-DA28-499B-84DA-B4278C54300D}"/>
+          </ac:picMkLst>
+        </pc:picChg>
+      </pc:sldChg>
+    </pc:docChg>
+  </pc:docChgLst>
+  <pc:docChgLst>
     <pc:chgData name="muhammadalfarouk" userId="S::muhammadalfarouk_gmail.com#ext#@ohana042.onmicrosoft.com::5292c31f-a7fd-45dd-94dd-dbfc7faa15e4" providerId="AD" clId="Web-{F03C2BA2-F335-42C3-AC51-480E6A147057}"/>
     <pc:docChg chg="addSld delSld modSld">
       <pc:chgData name="muhammadalfarouk" userId="S::muhammadalfarouk_gmail.com#ext#@ohana042.onmicrosoft.com::5292c31f-a7fd-45dd-94dd-dbfc7faa15e4" providerId="AD" clId="Web-{F03C2BA2-F335-42C3-AC51-480E6A147057}" dt="2020-11-02T09:13:45.949" v="14" actId="20577"/>
@@ -340,200 +534,6 @@
             <ac:spMk id="2" creationId="{52A67465-8F6A-4B41-A9E0-26BEB68AF235}"/>
           </ac:spMkLst>
         </pc:spChg>
-      </pc:sldChg>
-    </pc:docChg>
-  </pc:docChgLst>
-  <pc:docChgLst>
-    <pc:chgData name="swift" userId="S::swift1699_gmail.com#ext#@ohana042.onmicrosoft.com::75bb29f9-690c-4fad-984c-04f4d2790b53" providerId="AD" clId="Web-{18847984-1E08-A796-A12F-F7160350E3ED}"/>
-    <pc:docChg chg="addSld delSld modSld">
-      <pc:chgData name="swift" userId="S::swift1699_gmail.com#ext#@ohana042.onmicrosoft.com::75bb29f9-690c-4fad-984c-04f4d2790b53" providerId="AD" clId="Web-{18847984-1E08-A796-A12F-F7160350E3ED}" dt="2020-11-01T00:26:01.039" v="240" actId="1076"/>
-      <pc:docMkLst>
-        <pc:docMk/>
-      </pc:docMkLst>
-      <pc:sldChg chg="modSp">
-        <pc:chgData name="swift" userId="S::swift1699_gmail.com#ext#@ohana042.onmicrosoft.com::75bb29f9-690c-4fad-984c-04f4d2790b53" providerId="AD" clId="Web-{18847984-1E08-A796-A12F-F7160350E3ED}" dt="2020-10-31T21:50:36.796" v="28" actId="20577"/>
-        <pc:sldMkLst>
-          <pc:docMk/>
-          <pc:sldMk cId="109857222" sldId="256"/>
-        </pc:sldMkLst>
-        <pc:spChg chg="mod">
-          <ac:chgData name="swift" userId="S::swift1699_gmail.com#ext#@ohana042.onmicrosoft.com::75bb29f9-690c-4fad-984c-04f4d2790b53" providerId="AD" clId="Web-{18847984-1E08-A796-A12F-F7160350E3ED}" dt="2020-10-31T21:50:36.796" v="28" actId="20577"/>
-          <ac:spMkLst>
-            <pc:docMk/>
-            <pc:sldMk cId="109857222" sldId="256"/>
-            <ac:spMk id="2" creationId="{00000000-0000-0000-0000-000000000000}"/>
-          </ac:spMkLst>
-        </pc:spChg>
-      </pc:sldChg>
-      <pc:sldChg chg="addSp delSp modSp new">
-        <pc:chgData name="swift" userId="S::swift1699_gmail.com#ext#@ohana042.onmicrosoft.com::75bb29f9-690c-4fad-984c-04f4d2790b53" providerId="AD" clId="Web-{18847984-1E08-A796-A12F-F7160350E3ED}" dt="2020-11-01T00:18:18.510" v="191" actId="14100"/>
-        <pc:sldMkLst>
-          <pc:docMk/>
-          <pc:sldMk cId="3193242618" sldId="259"/>
-        </pc:sldMkLst>
-        <pc:spChg chg="del mod">
-          <ac:chgData name="swift" userId="S::swift1699_gmail.com#ext#@ohana042.onmicrosoft.com::75bb29f9-690c-4fad-984c-04f4d2790b53" providerId="AD" clId="Web-{18847984-1E08-A796-A12F-F7160350E3ED}" dt="2020-11-01T00:15:22.833" v="159"/>
-          <ac:spMkLst>
-            <pc:docMk/>
-            <pc:sldMk cId="3193242618" sldId="259"/>
-            <ac:spMk id="3" creationId="{C56C5C63-FF79-49A2-B384-93ED6B1C43BE}"/>
-          </ac:spMkLst>
-        </pc:spChg>
-        <pc:picChg chg="add mod ord">
-          <ac:chgData name="swift" userId="S::swift1699_gmail.com#ext#@ohana042.onmicrosoft.com::75bb29f9-690c-4fad-984c-04f4d2790b53" providerId="AD" clId="Web-{18847984-1E08-A796-A12F-F7160350E3ED}" dt="2020-11-01T00:18:18.510" v="191" actId="14100"/>
-          <ac:picMkLst>
-            <pc:docMk/>
-            <pc:sldMk cId="3193242618" sldId="259"/>
-            <ac:picMk id="4" creationId="{9BAD6616-41FE-46E0-9709-61844EA3B54A}"/>
-          </ac:picMkLst>
-        </pc:picChg>
-        <pc:picChg chg="add mod">
-          <ac:chgData name="swift" userId="S::swift1699_gmail.com#ext#@ohana042.onmicrosoft.com::75bb29f9-690c-4fad-984c-04f4d2790b53" providerId="AD" clId="Web-{18847984-1E08-A796-A12F-F7160350E3ED}" dt="2020-11-01T00:16:59.681" v="180" actId="1076"/>
-          <ac:picMkLst>
-            <pc:docMk/>
-            <pc:sldMk cId="3193242618" sldId="259"/>
-            <ac:picMk id="5" creationId="{EC40FD11-90CD-41A2-8808-C5A724A023A9}"/>
-          </ac:picMkLst>
-        </pc:picChg>
-        <pc:picChg chg="add mod">
-          <ac:chgData name="swift" userId="S::swift1699_gmail.com#ext#@ohana042.onmicrosoft.com::75bb29f9-690c-4fad-984c-04f4d2790b53" providerId="AD" clId="Web-{18847984-1E08-A796-A12F-F7160350E3ED}" dt="2020-11-01T00:17:31.557" v="185" actId="14100"/>
-          <ac:picMkLst>
-            <pc:docMk/>
-            <pc:sldMk cId="3193242618" sldId="259"/>
-            <ac:picMk id="6" creationId="{CD75B64D-BF89-4F7D-AE54-0419F69FE8A6}"/>
-          </ac:picMkLst>
-        </pc:picChg>
-        <pc:picChg chg="add mod">
-          <ac:chgData name="swift" userId="S::swift1699_gmail.com#ext#@ohana042.onmicrosoft.com::75bb29f9-690c-4fad-984c-04f4d2790b53" providerId="AD" clId="Web-{18847984-1E08-A796-A12F-F7160350E3ED}" dt="2020-11-01T00:18:07.120" v="190" actId="14100"/>
-          <ac:picMkLst>
-            <pc:docMk/>
-            <pc:sldMk cId="3193242618" sldId="259"/>
-            <ac:picMk id="7" creationId="{AB8C22D1-20D0-4E9C-BFCA-AF0BA29EA071}"/>
-          </ac:picMkLst>
-        </pc:picChg>
-      </pc:sldChg>
-      <pc:sldChg chg="addSp delSp modSp new">
-        <pc:chgData name="swift" userId="S::swift1699_gmail.com#ext#@ohana042.onmicrosoft.com::75bb29f9-690c-4fad-984c-04f4d2790b53" providerId="AD" clId="Web-{18847984-1E08-A796-A12F-F7160350E3ED}" dt="2020-10-31T22:09:57.899" v="109" actId="1076"/>
-        <pc:sldMkLst>
-          <pc:docMk/>
-          <pc:sldMk cId="1267369005" sldId="261"/>
-        </pc:sldMkLst>
-        <pc:spChg chg="mod">
-          <ac:chgData name="swift" userId="S::swift1699_gmail.com#ext#@ohana042.onmicrosoft.com::75bb29f9-690c-4fad-984c-04f4d2790b53" providerId="AD" clId="Web-{18847984-1E08-A796-A12F-F7160350E3ED}" dt="2020-10-31T22:09:43.102" v="106" actId="1076"/>
-          <ac:spMkLst>
-            <pc:docMk/>
-            <pc:sldMk cId="1267369005" sldId="261"/>
-            <ac:spMk id="2" creationId="{587F4538-A939-4452-B475-332F44BC6F2F}"/>
-          </ac:spMkLst>
-        </pc:spChg>
-        <pc:spChg chg="del">
-          <ac:chgData name="swift" userId="S::swift1699_gmail.com#ext#@ohana042.onmicrosoft.com::75bb29f9-690c-4fad-984c-04f4d2790b53" providerId="AD" clId="Web-{18847984-1E08-A796-A12F-F7160350E3ED}" dt="2020-10-31T22:08:02.649" v="90"/>
-          <ac:spMkLst>
-            <pc:docMk/>
-            <pc:sldMk cId="1267369005" sldId="261"/>
-            <ac:spMk id="3" creationId="{89F80E3E-9E2B-4B2A-A556-13CBAF3D1597}"/>
-          </ac:spMkLst>
-        </pc:spChg>
-        <pc:picChg chg="add mod ord modCrop">
-          <ac:chgData name="swift" userId="S::swift1699_gmail.com#ext#@ohana042.onmicrosoft.com::75bb29f9-690c-4fad-984c-04f4d2790b53" providerId="AD" clId="Web-{18847984-1E08-A796-A12F-F7160350E3ED}" dt="2020-10-31T22:09:57.899" v="109" actId="1076"/>
-          <ac:picMkLst>
-            <pc:docMk/>
-            <pc:sldMk cId="1267369005" sldId="261"/>
-            <ac:picMk id="4" creationId="{44AFD46C-F221-43EF-B008-F2FE8FB420FB}"/>
-          </ac:picMkLst>
-        </pc:picChg>
-      </pc:sldChg>
-      <pc:sldChg chg="modSp new">
-        <pc:chgData name="swift" userId="S::swift1699_gmail.com#ext#@ohana042.onmicrosoft.com::75bb29f9-690c-4fad-984c-04f4d2790b53" providerId="AD" clId="Web-{18847984-1E08-A796-A12F-F7160350E3ED}" dt="2020-10-31T22:16:52.622" v="152" actId="20577"/>
-        <pc:sldMkLst>
-          <pc:docMk/>
-          <pc:sldMk cId="4101956405" sldId="262"/>
-        </pc:sldMkLst>
-        <pc:spChg chg="mod">
-          <ac:chgData name="swift" userId="S::swift1699_gmail.com#ext#@ohana042.onmicrosoft.com::75bb29f9-690c-4fad-984c-04f4d2790b53" providerId="AD" clId="Web-{18847984-1E08-A796-A12F-F7160350E3ED}" dt="2020-10-31T22:16:52.622" v="152" actId="20577"/>
-          <ac:spMkLst>
-            <pc:docMk/>
-            <pc:sldMk cId="4101956405" sldId="262"/>
-            <ac:spMk id="2" creationId="{39C6DD24-F269-4AA6-B41B-431B19BDFF22}"/>
-          </ac:spMkLst>
-        </pc:spChg>
-      </pc:sldChg>
-      <pc:sldChg chg="addSp modSp new">
-        <pc:chgData name="swift" userId="S::swift1699_gmail.com#ext#@ohana042.onmicrosoft.com::75bb29f9-690c-4fad-984c-04f4d2790b53" providerId="AD" clId="Web-{18847984-1E08-A796-A12F-F7160350E3ED}" dt="2020-11-01T00:24:57.003" v="219" actId="14100"/>
-        <pc:sldMkLst>
-          <pc:docMk/>
-          <pc:sldMk cId="1877693977" sldId="263"/>
-        </pc:sldMkLst>
-        <pc:spChg chg="mod">
-          <ac:chgData name="swift" userId="S::swift1699_gmail.com#ext#@ohana042.onmicrosoft.com::75bb29f9-690c-4fad-984c-04f4d2790b53" providerId="AD" clId="Web-{18847984-1E08-A796-A12F-F7160350E3ED}" dt="2020-11-01T00:23:43.214" v="199" actId="20577"/>
-          <ac:spMkLst>
-            <pc:docMk/>
-            <pc:sldMk cId="1877693977" sldId="263"/>
-            <ac:spMk id="2" creationId="{A5DD6B90-6B49-457B-A17F-8FCA3DBC00F1}"/>
-          </ac:spMkLst>
-        </pc:spChg>
-        <pc:picChg chg="add mod">
-          <ac:chgData name="swift" userId="S::swift1699_gmail.com#ext#@ohana042.onmicrosoft.com::75bb29f9-690c-4fad-984c-04f4d2790b53" providerId="AD" clId="Web-{18847984-1E08-A796-A12F-F7160350E3ED}" dt="2020-11-01T00:24:03.824" v="205" actId="1076"/>
-          <ac:picMkLst>
-            <pc:docMk/>
-            <pc:sldMk cId="1877693977" sldId="263"/>
-            <ac:picMk id="3" creationId="{57B776F1-90B9-41C2-A895-F73F855610E9}"/>
-          </ac:picMkLst>
-        </pc:picChg>
-        <pc:picChg chg="add mod">
-          <ac:chgData name="swift" userId="S::swift1699_gmail.com#ext#@ohana042.onmicrosoft.com::75bb29f9-690c-4fad-984c-04f4d2790b53" providerId="AD" clId="Web-{18847984-1E08-A796-A12F-F7160350E3ED}" dt="2020-11-01T00:24:23.543" v="211" actId="1076"/>
-          <ac:picMkLst>
-            <pc:docMk/>
-            <pc:sldMk cId="1877693977" sldId="263"/>
-            <ac:picMk id="4" creationId="{EAE075FA-916A-40BF-B5B8-003A25484CB6}"/>
-          </ac:picMkLst>
-        </pc:picChg>
-        <pc:picChg chg="add mod">
-          <ac:chgData name="swift" userId="S::swift1699_gmail.com#ext#@ohana042.onmicrosoft.com::75bb29f9-690c-4fad-984c-04f4d2790b53" providerId="AD" clId="Web-{18847984-1E08-A796-A12F-F7160350E3ED}" dt="2020-11-01T00:24:57.003" v="219" actId="14100"/>
-          <ac:picMkLst>
-            <pc:docMk/>
-            <pc:sldMk cId="1877693977" sldId="263"/>
-            <ac:picMk id="5" creationId="{C14312DF-EF9D-43AE-9BF5-B566AF5ED8D9}"/>
-          </ac:picMkLst>
-        </pc:picChg>
-      </pc:sldChg>
-      <pc:sldChg chg="new del">
-        <pc:chgData name="swift" userId="S::swift1699_gmail.com#ext#@ohana042.onmicrosoft.com::75bb29f9-690c-4fad-984c-04f4d2790b53" providerId="AD" clId="Web-{18847984-1E08-A796-A12F-F7160350E3ED}" dt="2020-11-01T00:23:27.397" v="193"/>
-        <pc:sldMkLst>
-          <pc:docMk/>
-          <pc:sldMk cId="3845205481" sldId="263"/>
-        </pc:sldMkLst>
-      </pc:sldChg>
-      <pc:sldChg chg="addSp modSp new">
-        <pc:chgData name="swift" userId="S::swift1699_gmail.com#ext#@ohana042.onmicrosoft.com::75bb29f9-690c-4fad-984c-04f4d2790b53" providerId="AD" clId="Web-{18847984-1E08-A796-A12F-F7160350E3ED}" dt="2020-11-01T00:26:01.039" v="240" actId="1076"/>
-        <pc:sldMkLst>
-          <pc:docMk/>
-          <pc:sldMk cId="2085439630" sldId="264"/>
-        </pc:sldMkLst>
-        <pc:spChg chg="mod">
-          <ac:chgData name="swift" userId="S::swift1699_gmail.com#ext#@ohana042.onmicrosoft.com::75bb29f9-690c-4fad-984c-04f4d2790b53" providerId="AD" clId="Web-{18847984-1E08-A796-A12F-F7160350E3ED}" dt="2020-11-01T00:25:18.007" v="231" actId="20577"/>
-          <ac:spMkLst>
-            <pc:docMk/>
-            <pc:sldMk cId="2085439630" sldId="264"/>
-            <ac:spMk id="2" creationId="{9379D913-B49C-4DE7-BD7B-E2ABC2E358C1}"/>
-          </ac:spMkLst>
-        </pc:spChg>
-        <pc:picChg chg="add mod">
-          <ac:chgData name="swift" userId="S::swift1699_gmail.com#ext#@ohana042.onmicrosoft.com::75bb29f9-690c-4fad-984c-04f4d2790b53" providerId="AD" clId="Web-{18847984-1E08-A796-A12F-F7160350E3ED}" dt="2020-11-01T00:25:49.570" v="237" actId="1076"/>
-          <ac:picMkLst>
-            <pc:docMk/>
-            <pc:sldMk cId="2085439630" sldId="264"/>
-            <ac:picMk id="3" creationId="{4684C647-4F19-4553-B741-112FE3F7B33C}"/>
-          </ac:picMkLst>
-        </pc:picChg>
-        <pc:picChg chg="add mod">
-          <ac:chgData name="swift" userId="S::swift1699_gmail.com#ext#@ohana042.onmicrosoft.com::75bb29f9-690c-4fad-984c-04f4d2790b53" providerId="AD" clId="Web-{18847984-1E08-A796-A12F-F7160350E3ED}" dt="2020-11-01T00:26:01.039" v="240" actId="1076"/>
-          <ac:picMkLst>
-            <pc:docMk/>
-            <pc:sldMk cId="2085439630" sldId="264"/>
-            <ac:picMk id="4" creationId="{45E1A4A2-DA28-499B-84DA-B4278C54300D}"/>
-          </ac:picMkLst>
-        </pc:picChg>
       </pc:sldChg>
     </pc:docChg>
   </pc:docChgLst>
@@ -7769,7 +7769,7 @@
           </a:effectLst>
           <a:extLst>
             <a:ext uri="{91240B29-F687-4f45-9708-019B960494DF}">
-              <a14:hiddenLine xmlns="" xmlns:a14="http://schemas.microsoft.com/office/drawing/2010/main" xmlns:p14="http://schemas.microsoft.com/office/powerpoint/2010/main" xmlns:a16="http://schemas.microsoft.com/office/drawing/2014/main" w="9525">
+              <a14:hiddenLine xmlns:a16="http://schemas.microsoft.com/office/drawing/2014/main" xmlns:p14="http://schemas.microsoft.com/office/powerpoint/2010/main" xmlns:a14="http://schemas.microsoft.com/office/drawing/2010/main" xmlns="" w="9525">
                 <a:solidFill>
                   <a:srgbClr val="000000"/>
                 </a:solidFill>
@@ -7839,7 +7839,7 @@
         </p:spPr>
         <p:txBody>
           <a:bodyPr>
-            <a:normAutofit lnSpcReduction="10000"/>
+            <a:normAutofit fontScale="92500" lnSpcReduction="20000"/>
           </a:bodyPr>
           <a:lstStyle/>
           <a:p>
@@ -7849,7 +7849,7 @@
               </a:lnSpc>
             </a:pPr>
             <a:r>
-              <a:rPr lang="en-US" sz="1300">
+              <a:rPr lang="en-US" sz="1300" dirty="0">
                 <a:solidFill>
                   <a:srgbClr val="EA9813"/>
                 </a:solidFill>
@@ -7857,7 +7857,7 @@
               <a:t>Team </a:t>
             </a:r>
             <a:r>
-              <a:rPr lang="en-US" sz="1300" err="1">
+              <a:rPr lang="en-US" sz="1300" dirty="0" err="1">
                 <a:solidFill>
                   <a:srgbClr val="EA9813"/>
                 </a:solidFill>
@@ -7865,12 +7865,104 @@
               <a:t>Noobcoder</a:t>
             </a:r>
             <a:r>
-              <a:rPr lang="en-US" sz="1300">
+              <a:rPr lang="en-US" sz="1300" dirty="0">
                 <a:solidFill>
                   <a:srgbClr val="EA9813"/>
                 </a:solidFill>
               </a:rPr>
               <a:t>:</a:t>
+            </a:r>
+            <a:br>
+              <a:rPr lang="en-US" sz="1300" dirty="0">
+                <a:solidFill>
+                  <a:srgbClr val="EA9813"/>
+                </a:solidFill>
+              </a:rPr>
+            </a:br>
+            <a:r>
+              <a:rPr lang="en-US" sz="1300" dirty="0">
+                <a:solidFill>
+                  <a:srgbClr val="EA9813"/>
+                </a:solidFill>
+              </a:rPr>
+              <a:t>Muhammad Amirul Hakimi bin  </a:t>
+            </a:r>
+            <a:r>
+              <a:rPr lang="en-US" sz="1300" dirty="0" err="1">
+                <a:solidFill>
+                  <a:srgbClr val="EA9813"/>
+                </a:solidFill>
+              </a:rPr>
+              <a:t>Zaprunnizam</a:t>
+            </a:r>
+            <a:br>
+              <a:rPr lang="en-US" sz="1300" dirty="0">
+                <a:solidFill>
+                  <a:srgbClr val="EA9813"/>
+                </a:solidFill>
+              </a:rPr>
+            </a:br>
+            <a:r>
+              <a:rPr lang="en-US" sz="1300" dirty="0">
+                <a:solidFill>
+                  <a:srgbClr val="EA9813"/>
+                </a:solidFill>
+              </a:rPr>
+              <a:t>Muhammad Farid Izwan Bin Mohamad Shabri</a:t>
+            </a:r>
+            <a:br>
+              <a:rPr lang="en-US" sz="1300" dirty="0">
+                <a:solidFill>
+                  <a:srgbClr val="EA9813"/>
+                </a:solidFill>
+              </a:rPr>
+            </a:br>
+            <a:r>
+              <a:rPr lang="en-US" sz="1300" dirty="0">
+                <a:solidFill>
+                  <a:srgbClr val="EA9813"/>
+                </a:solidFill>
+              </a:rPr>
+              <a:t>Muhammad Amjad Bin Abdul Malik</a:t>
+            </a:r>
+            <a:br>
+              <a:rPr lang="en-US" sz="1300" dirty="0">
+                <a:solidFill>
+                  <a:srgbClr val="EA9813"/>
+                </a:solidFill>
+              </a:rPr>
+            </a:br>
+            <a:r>
+              <a:rPr lang="en-US" sz="1300" dirty="0">
+                <a:solidFill>
+                  <a:srgbClr val="EA9813"/>
+                </a:solidFill>
+              </a:rPr>
+              <a:t>Muhammad Iqbal Bin </a:t>
+            </a:r>
+            <a:r>
+              <a:rPr lang="en-US" sz="1300" dirty="0" err="1">
+                <a:solidFill>
+                  <a:srgbClr val="EA9813"/>
+                </a:solidFill>
+              </a:rPr>
+              <a:t>Mohd</a:t>
+            </a:r>
+            <a:r>
+              <a:rPr lang="en-US" sz="1300" dirty="0">
+                <a:solidFill>
+                  <a:srgbClr val="EA9813"/>
+                </a:solidFill>
+              </a:rPr>
+              <a:t> </a:t>
+            </a:r>
+            <a:r>
+              <a:rPr lang="en-US" sz="1300" dirty="0" err="1">
+                <a:solidFill>
+                  <a:srgbClr val="EA9813"/>
+                </a:solidFill>
+              </a:rPr>
+              <a:t>Fauzi</a:t>
             </a:r>
             <a:br>
               <a:rPr lang="en-US" sz="1300">
@@ -7879,91 +7971,6 @@
                 </a:solidFill>
               </a:rPr>
             </a:br>
-            <a:r>
-              <a:rPr lang="en-US" sz="1300">
-                <a:solidFill>
-                  <a:srgbClr val="EA9813"/>
-                </a:solidFill>
-              </a:rPr>
-              <a:t>Muhammad Amirul Hakimi bin  </a:t>
-            </a:r>
-            <a:r>
-              <a:rPr lang="en-US" sz="1300" err="1">
-                <a:solidFill>
-                  <a:srgbClr val="EA9813"/>
-                </a:solidFill>
-              </a:rPr>
-              <a:t>Zaprunnizam</a:t>
-            </a:r>
-            <a:br>
-              <a:rPr lang="en-US" sz="1300">
-                <a:solidFill>
-                  <a:srgbClr val="EA9813"/>
-                </a:solidFill>
-              </a:rPr>
-            </a:br>
-            <a:r>
-              <a:rPr lang="en-US" sz="1300">
-                <a:solidFill>
-                  <a:srgbClr val="EA9813"/>
-                </a:solidFill>
-              </a:rPr>
-              <a:t>Muhammad Farid Izwan Bin Mohamad Shabri</a:t>
-            </a:r>
-            <a:br>
-              <a:rPr lang="en-US" sz="1300">
-                <a:solidFill>
-                  <a:srgbClr val="EA9813"/>
-                </a:solidFill>
-              </a:rPr>
-            </a:br>
-            <a:r>
-              <a:rPr lang="en-US" sz="1300">
-                <a:solidFill>
-                  <a:srgbClr val="EA9813"/>
-                </a:solidFill>
-              </a:rPr>
-              <a:t>Muhammad Amjad Bin Abdul Malik</a:t>
-            </a:r>
-            <a:br>
-              <a:rPr lang="en-US" sz="1300">
-                <a:solidFill>
-                  <a:srgbClr val="EA9813"/>
-                </a:solidFill>
-              </a:rPr>
-            </a:br>
-            <a:r>
-              <a:rPr lang="en-US" sz="1300">
-                <a:solidFill>
-                  <a:srgbClr val="EA9813"/>
-                </a:solidFill>
-              </a:rPr>
-              <a:t>Muhammad Iqbal Bin </a:t>
-            </a:r>
-            <a:r>
-              <a:rPr lang="en-US" sz="1300" err="1">
-                <a:solidFill>
-                  <a:srgbClr val="EA9813"/>
-                </a:solidFill>
-              </a:rPr>
-              <a:t>Mohd</a:t>
-            </a:r>
-            <a:r>
-              <a:rPr lang="en-US" sz="1300">
-                <a:solidFill>
-                  <a:srgbClr val="EA9813"/>
-                </a:solidFill>
-              </a:rPr>
-              <a:t> </a:t>
-            </a:r>
-            <a:r>
-              <a:rPr lang="en-US" sz="1300" err="1">
-                <a:solidFill>
-                  <a:srgbClr val="EA9813"/>
-                </a:solidFill>
-              </a:rPr>
-              <a:t>Fauzi</a:t>
-            </a:r>
             <a:br>
               <a:rPr lang="en-US" sz="1300">
                 <a:solidFill>
@@ -10840,6 +10847,21 @@
 </file>
 
 <file path=customXml/item1.xml><?xml version="1.0" encoding="utf-8"?>
+<?mso-contentType ?>
+<FormTemplates xmlns="http://schemas.microsoft.com/sharepoint/v3/contenttype/forms">
+  <Display>DocumentLibraryForm</Display>
+  <Edit>DocumentLibraryForm</Edit>
+  <New>DocumentLibraryForm</New>
+</FormTemplates>
+</file>
+
+<file path=customXml/item2.xml><?xml version="1.0" encoding="utf-8"?>
+<p:properties xmlns:p="http://schemas.microsoft.com/office/2006/metadata/properties" xmlns:xsi="http://www.w3.org/2001/XMLSchema-instance" xmlns:pc="http://schemas.microsoft.com/office/infopath/2007/PartnerControls">
+  <documentManagement/>
+</p:properties>
+</file>
+
+<file path=customXml/item3.xml><?xml version="1.0" encoding="utf-8"?>
 <ct:contentTypeSchema xmlns:ct="http://schemas.microsoft.com/office/2006/metadata/contentType" xmlns:ma="http://schemas.microsoft.com/office/2006/metadata/properties/metaAttributes" ct:_="" ma:_="" ma:contentTypeName="Document" ma:contentTypeID="0x010100D973745A54E1F940816A7DA2A8D1DDBD" ma:contentTypeVersion="2" ma:contentTypeDescription="Create a new document." ma:contentTypeScope="" ma:versionID="84b7a6704b22df89a7c9e55e2653863b">
   <xsd:schema xmlns:xsd="http://www.w3.org/2001/XMLSchema" xmlns:xs="http://www.w3.org/2001/XMLSchema" xmlns:p="http://schemas.microsoft.com/office/2006/metadata/properties" xmlns:ns2="e0689a4a-487c-484b-bb27-80183cfbfa40" targetNamespace="http://schemas.microsoft.com/office/2006/metadata/properties" ma:root="true" ma:fieldsID="31532077622de2acde8666fafb6fa5ef" ns2:_="">
     <xsd:import namespace="e0689a4a-487c-484b-bb27-80183cfbfa40"/>
@@ -10971,35 +10993,10 @@
 </ct:contentTypeSchema>
 </file>
 
-<file path=customXml/item2.xml><?xml version="1.0" encoding="utf-8"?>
-<p:properties xmlns:p="http://schemas.microsoft.com/office/2006/metadata/properties" xmlns:xsi="http://www.w3.org/2001/XMLSchema-instance" xmlns:pc="http://schemas.microsoft.com/office/infopath/2007/PartnerControls">
-  <documentManagement/>
-</p:properties>
-</file>
-
-<file path=customXml/item3.xml><?xml version="1.0" encoding="utf-8"?>
-<?mso-contentType ?>
-<FormTemplates xmlns="http://schemas.microsoft.com/sharepoint/v3/contenttype/forms">
-  <Display>DocumentLibraryForm</Display>
-  <Edit>DocumentLibraryForm</Edit>
-  <New>DocumentLibraryForm</New>
-</FormTemplates>
-</file>
-
 <file path=customXml/itemProps1.xml><?xml version="1.0" encoding="utf-8"?>
-<ds:datastoreItem xmlns:ds="http://schemas.openxmlformats.org/officeDocument/2006/customXml" ds:itemID="{3C65A8F5-1FA2-43C9-A06A-AAACAD7AEB36}">
+<ds:datastoreItem xmlns:ds="http://schemas.openxmlformats.org/officeDocument/2006/customXml" ds:itemID="{16B8BC23-5248-44F8-99D8-B240F62E2EEE}">
   <ds:schemaRefs>
-    <ds:schemaRef ds:uri="e0689a4a-487c-484b-bb27-80183cfbfa40"/>
-    <ds:schemaRef ds:uri="http://purl.org/dc/elements/1.1/"/>
-    <ds:schemaRef ds:uri="http://purl.org/dc/terms/"/>
-    <ds:schemaRef ds:uri="http://schemas.microsoft.com/internal/obd"/>
-    <ds:schemaRef ds:uri="http://schemas.microsoft.com/office/2006/documentManagement/types"/>
-    <ds:schemaRef ds:uri="http://schemas.microsoft.com/office/2006/metadata/contentType"/>
-    <ds:schemaRef ds:uri="http://schemas.microsoft.com/office/2006/metadata/properties"/>
-    <ds:schemaRef ds:uri="http://schemas.microsoft.com/office/2006/metadata/properties/metaAttributes"/>
-    <ds:schemaRef ds:uri="http://schemas.microsoft.com/office/infopath/2007/PartnerControls"/>
-    <ds:schemaRef ds:uri="http://schemas.openxmlformats.org/package/2006/metadata/core-properties"/>
-    <ds:schemaRef ds:uri="http://www.w3.org/2001/XMLSchema"/>
+    <ds:schemaRef ds:uri="http://schemas.microsoft.com/sharepoint/v3/contenttype/forms"/>
   </ds:schemaRefs>
 </ds:datastoreItem>
 </file>
@@ -11021,9 +11018,19 @@
 </file>
 
 <file path=customXml/itemProps3.xml><?xml version="1.0" encoding="utf-8"?>
-<ds:datastoreItem xmlns:ds="http://schemas.openxmlformats.org/officeDocument/2006/customXml" ds:itemID="{16B8BC23-5248-44F8-99D8-B240F62E2EEE}">
+<ds:datastoreItem xmlns:ds="http://schemas.openxmlformats.org/officeDocument/2006/customXml" ds:itemID="{3C65A8F5-1FA2-43C9-A06A-AAACAD7AEB36}">
   <ds:schemaRefs>
-    <ds:schemaRef ds:uri="http://schemas.microsoft.com/sharepoint/v3/contenttype/forms"/>
+    <ds:schemaRef ds:uri="e0689a4a-487c-484b-bb27-80183cfbfa40"/>
+    <ds:schemaRef ds:uri="http://purl.org/dc/elements/1.1/"/>
+    <ds:schemaRef ds:uri="http://purl.org/dc/terms/"/>
+    <ds:schemaRef ds:uri="http://schemas.microsoft.com/internal/obd"/>
+    <ds:schemaRef ds:uri="http://schemas.microsoft.com/office/2006/documentManagement/types"/>
+    <ds:schemaRef ds:uri="http://schemas.microsoft.com/office/2006/metadata/contentType"/>
+    <ds:schemaRef ds:uri="http://schemas.microsoft.com/office/2006/metadata/properties"/>
+    <ds:schemaRef ds:uri="http://schemas.microsoft.com/office/2006/metadata/properties/metaAttributes"/>
+    <ds:schemaRef ds:uri="http://schemas.microsoft.com/office/infopath/2007/PartnerControls"/>
+    <ds:schemaRef ds:uri="http://schemas.openxmlformats.org/package/2006/metadata/core-properties"/>
+    <ds:schemaRef ds:uri="http://www.w3.org/2001/XMLSchema"/>
   </ds:schemaRefs>
 </ds:datastoreItem>
 </file>
</xml_diff>